<commit_message>
image extaction from powerpoints
</commit_message>
<xml_diff>
--- a/tests/files/example.pptx
+++ b/tests/files/example.pptx
@@ -302,7 +302,7 @@
           <a:p>
             <a:fld id="{5BCAD085-E8A6-8845-BD4E-CB4CCA059FC4}" type="datetimeFigureOut">
               <a:rPr lang="en-US" smtClean="0"/>
-              <a:t>3/21/2024</a:t>
+              <a:t>3/23/2024</a:t>
             </a:fld>
             <a:endParaRPr lang="en-US"/>
           </a:p>
@@ -470,7 +470,7 @@
           <a:p>
             <a:fld id="{5BCAD085-E8A6-8845-BD4E-CB4CCA059FC4}" type="datetimeFigureOut">
               <a:rPr lang="en-US" smtClean="0"/>
-              <a:t>3/21/2024</a:t>
+              <a:t>3/23/2024</a:t>
             </a:fld>
             <a:endParaRPr lang="en-US"/>
           </a:p>
@@ -648,7 +648,7 @@
           <a:p>
             <a:fld id="{5BCAD085-E8A6-8845-BD4E-CB4CCA059FC4}" type="datetimeFigureOut">
               <a:rPr lang="en-US" smtClean="0"/>
-              <a:t>3/21/2024</a:t>
+              <a:t>3/23/2024</a:t>
             </a:fld>
             <a:endParaRPr lang="en-US"/>
           </a:p>
@@ -816,7 +816,7 @@
           <a:p>
             <a:fld id="{5BCAD085-E8A6-8845-BD4E-CB4CCA059FC4}" type="datetimeFigureOut">
               <a:rPr lang="en-US" smtClean="0"/>
-              <a:t>3/21/2024</a:t>
+              <a:t>3/23/2024</a:t>
             </a:fld>
             <a:endParaRPr lang="en-US"/>
           </a:p>
@@ -1061,7 +1061,7 @@
           <a:p>
             <a:fld id="{5BCAD085-E8A6-8845-BD4E-CB4CCA059FC4}" type="datetimeFigureOut">
               <a:rPr lang="en-US" smtClean="0"/>
-              <a:t>3/21/2024</a:t>
+              <a:t>3/23/2024</a:t>
             </a:fld>
             <a:endParaRPr lang="en-US"/>
           </a:p>
@@ -1346,7 +1346,7 @@
           <a:p>
             <a:fld id="{5BCAD085-E8A6-8845-BD4E-CB4CCA059FC4}" type="datetimeFigureOut">
               <a:rPr lang="en-US" smtClean="0"/>
-              <a:t>3/21/2024</a:t>
+              <a:t>3/23/2024</a:t>
             </a:fld>
             <a:endParaRPr lang="en-US"/>
           </a:p>
@@ -1765,7 +1765,7 @@
           <a:p>
             <a:fld id="{5BCAD085-E8A6-8845-BD4E-CB4CCA059FC4}" type="datetimeFigureOut">
               <a:rPr lang="en-US" smtClean="0"/>
-              <a:t>3/21/2024</a:t>
+              <a:t>3/23/2024</a:t>
             </a:fld>
             <a:endParaRPr lang="en-US"/>
           </a:p>
@@ -1882,7 +1882,7 @@
           <a:p>
             <a:fld id="{5BCAD085-E8A6-8845-BD4E-CB4CCA059FC4}" type="datetimeFigureOut">
               <a:rPr lang="en-US" smtClean="0"/>
-              <a:t>3/21/2024</a:t>
+              <a:t>3/23/2024</a:t>
             </a:fld>
             <a:endParaRPr lang="en-US"/>
           </a:p>
@@ -1977,7 +1977,7 @@
           <a:p>
             <a:fld id="{5BCAD085-E8A6-8845-BD4E-CB4CCA059FC4}" type="datetimeFigureOut">
               <a:rPr lang="en-US" smtClean="0"/>
-              <a:t>3/21/2024</a:t>
+              <a:t>3/23/2024</a:t>
             </a:fld>
             <a:endParaRPr lang="en-US"/>
           </a:p>
@@ -2252,7 +2252,7 @@
           <a:p>
             <a:fld id="{5BCAD085-E8A6-8845-BD4E-CB4CCA059FC4}" type="datetimeFigureOut">
               <a:rPr lang="en-US" smtClean="0"/>
-              <a:t>3/21/2024</a:t>
+              <a:t>3/23/2024</a:t>
             </a:fld>
             <a:endParaRPr lang="en-US"/>
           </a:p>
@@ -2504,7 +2504,7 @@
           <a:p>
             <a:fld id="{5BCAD085-E8A6-8845-BD4E-CB4CCA059FC4}" type="datetimeFigureOut">
               <a:rPr lang="en-US" smtClean="0"/>
-              <a:t>3/21/2024</a:t>
+              <a:t>3/23/2024</a:t>
             </a:fld>
             <a:endParaRPr lang="en-US"/>
           </a:p>
@@ -2715,7 +2715,7 @@
           <a:p>
             <a:fld id="{5BCAD085-E8A6-8845-BD4E-CB4CCA059FC4}" type="datetimeFigureOut">
               <a:rPr lang="en-US" smtClean="0"/>
-              <a:t>3/21/2024</a:t>
+              <a:t>3/23/2024</a:t>
             </a:fld>
             <a:endParaRPr lang="en-US"/>
           </a:p>
@@ -3102,7 +3102,7 @@
         </p:nvSpPr>
         <p:spPr>
           <a:xfrm>
-            <a:off x="685800" y="2138589"/>
+            <a:off x="685800" y="1158874"/>
             <a:ext cx="7772400" cy="1470025"/>
           </a:xfrm>
         </p:spPr>
@@ -3117,6 +3117,36 @@
           </a:p>
         </p:txBody>
       </p:sp>
+      <p:pic>
+        <p:nvPicPr>
+          <p:cNvPr id="4" name="Picture 3" descr="A cat and a chick on a couch&#10;&#10;Description automatically generated">
+            <a:extLst>
+              <a:ext uri="{FF2B5EF4-FFF2-40B4-BE49-F238E27FC236}">
+                <a16:creationId xmlns:a16="http://schemas.microsoft.com/office/drawing/2014/main" id="{24869196-6898-C348-637C-3625D454CC8F}"/>
+              </a:ext>
+            </a:extLst>
+          </p:cNvPr>
+          <p:cNvPicPr>
+            <a:picLocks noChangeAspect="1"/>
+          </p:cNvPicPr>
+          <p:nvPr/>
+        </p:nvPicPr>
+        <p:blipFill>
+          <a:blip r:embed="rId2"/>
+          <a:stretch>
+            <a:fillRect/>
+          </a:stretch>
+        </p:blipFill>
+        <p:spPr>
+          <a:xfrm>
+            <a:off x="2377751" y="2583415"/>
+            <a:ext cx="4388497" cy="3291373"/>
+          </a:xfrm>
+          <a:prstGeom prst="rect">
+            <a:avLst/>
+          </a:prstGeom>
+        </p:spPr>
+      </p:pic>
     </p:spTree>
   </p:cSld>
   <p:clrMapOvr>

</xml_diff>